<commit_message>
Added knn accuracy description
</commit_message>
<xml_diff>
--- a/Presentations/NASA/NASA presentation.pptx
+++ b/Presentations/NASA/NASA presentation.pptx
@@ -19,7 +19,8 @@
     <p:sldId id="269" r:id="rId13"/>
     <p:sldId id="270" r:id="rId14"/>
     <p:sldId id="271" r:id="rId15"/>
-    <p:sldId id="272" r:id="rId16"/>
+    <p:sldId id="273" r:id="rId16"/>
+    <p:sldId id="272" r:id="rId17"/>
   </p:sldIdLst>
   <p:sldSz cx="12192000" cy="6858000"/>
   <p:notesSz cx="6858000" cy="9144000"/>
@@ -367,7 +368,7 @@
             <a:fld id="{B61BEF0D-F0BB-DE4B-95CE-6DB70DBA9567}" type="datetimeFigureOut">
               <a:rPr lang="en-US" dirty="0"/>
               <a:pPr/>
-              <a:t>4/30/2018</a:t>
+              <a:t>5/11/2018</a:t>
             </a:fld>
             <a:endParaRPr lang="en-US" dirty="0"/>
           </a:p>
@@ -698,7 +699,7 @@
             <a:fld id="{B61BEF0D-F0BB-DE4B-95CE-6DB70DBA9567}" type="datetimeFigureOut">
               <a:rPr lang="en-US" dirty="0"/>
               <a:pPr/>
-              <a:t>4/30/2018</a:t>
+              <a:t>5/11/2018</a:t>
             </a:fld>
             <a:endParaRPr lang="en-US" dirty="0"/>
           </a:p>
@@ -973,7 +974,7 @@
             <a:fld id="{B61BEF0D-F0BB-DE4B-95CE-6DB70DBA9567}" type="datetimeFigureOut">
               <a:rPr lang="en-US" dirty="0"/>
               <a:pPr/>
-              <a:t>4/30/2018</a:t>
+              <a:t>5/11/2018</a:t>
             </a:fld>
             <a:endParaRPr lang="en-US" dirty="0"/>
           </a:p>
@@ -1538,7 +1539,7 @@
             <a:fld id="{B61BEF0D-F0BB-DE4B-95CE-6DB70DBA9567}" type="datetimeFigureOut">
               <a:rPr lang="en-US" dirty="0"/>
               <a:pPr/>
-              <a:t>4/30/2018</a:t>
+              <a:t>5/11/2018</a:t>
             </a:fld>
             <a:endParaRPr lang="en-US" dirty="0"/>
           </a:p>
@@ -1813,7 +1814,7 @@
             <a:fld id="{B61BEF0D-F0BB-DE4B-95CE-6DB70DBA9567}" type="datetimeFigureOut">
               <a:rPr lang="en-US" dirty="0"/>
               <a:pPr/>
-              <a:t>4/30/2018</a:t>
+              <a:t>5/11/2018</a:t>
             </a:fld>
             <a:endParaRPr lang="en-US" dirty="0"/>
           </a:p>
@@ -2372,7 +2373,7 @@
             <a:fld id="{B61BEF0D-F0BB-DE4B-95CE-6DB70DBA9567}" type="datetimeFigureOut">
               <a:rPr lang="en-US" dirty="0"/>
               <a:pPr/>
-              <a:t>4/30/2018</a:t>
+              <a:t>5/11/2018</a:t>
             </a:fld>
             <a:endParaRPr lang="en-US" dirty="0"/>
           </a:p>
@@ -2696,7 +2697,7 @@
             <a:fld id="{B61BEF0D-F0BB-DE4B-95CE-6DB70DBA9567}" type="datetimeFigureOut">
               <a:rPr lang="en-US" dirty="0"/>
               <a:pPr/>
-              <a:t>4/30/2018</a:t>
+              <a:t>5/11/2018</a:t>
             </a:fld>
             <a:endParaRPr lang="en-US" dirty="0"/>
           </a:p>
@@ -2870,7 +2871,7 @@
             <a:fld id="{B61BEF0D-F0BB-DE4B-95CE-6DB70DBA9567}" type="datetimeFigureOut">
               <a:rPr lang="en-US" dirty="0"/>
               <a:pPr/>
-              <a:t>4/30/2018</a:t>
+              <a:t>5/11/2018</a:t>
             </a:fld>
             <a:endParaRPr lang="en-US" dirty="0"/>
           </a:p>
@@ -3105,7 +3106,7 @@
             <a:fld id="{B61BEF0D-F0BB-DE4B-95CE-6DB70DBA9567}" type="datetimeFigureOut">
               <a:rPr lang="en-US" dirty="0"/>
               <a:pPr/>
-              <a:t>4/30/2018</a:t>
+              <a:t>5/11/2018</a:t>
             </a:fld>
             <a:endParaRPr lang="en-US" dirty="0"/>
           </a:p>
@@ -3302,7 +3303,7 @@
             <a:fld id="{B61BEF0D-F0BB-DE4B-95CE-6DB70DBA9567}" type="datetimeFigureOut">
               <a:rPr lang="en-US" dirty="0"/>
               <a:pPr/>
-              <a:t>4/30/2018</a:t>
+              <a:t>5/11/2018</a:t>
             </a:fld>
             <a:endParaRPr lang="en-US" dirty="0"/>
           </a:p>
@@ -3575,7 +3576,7 @@
             <a:fld id="{B61BEF0D-F0BB-DE4B-95CE-6DB70DBA9567}" type="datetimeFigureOut">
               <a:rPr lang="en-US" dirty="0"/>
               <a:pPr/>
-              <a:t>4/30/2018</a:t>
+              <a:t>5/11/2018</a:t>
             </a:fld>
             <a:endParaRPr lang="en-US" dirty="0"/>
           </a:p>
@@ -3838,7 +3839,7 @@
             <a:fld id="{B61BEF0D-F0BB-DE4B-95CE-6DB70DBA9567}" type="datetimeFigureOut">
               <a:rPr lang="en-US" dirty="0"/>
               <a:pPr/>
-              <a:t>4/30/2018</a:t>
+              <a:t>5/11/2018</a:t>
             </a:fld>
             <a:endParaRPr lang="en-US" dirty="0"/>
           </a:p>
@@ -4209,7 +4210,7 @@
             <a:fld id="{B61BEF0D-F0BB-DE4B-95CE-6DB70DBA9567}" type="datetimeFigureOut">
               <a:rPr lang="en-US" dirty="0"/>
               <a:pPr/>
-              <a:t>4/30/2018</a:t>
+              <a:t>5/11/2018</a:t>
             </a:fld>
             <a:endParaRPr lang="en-US" dirty="0"/>
           </a:p>
@@ -4354,7 +4355,7 @@
             <a:fld id="{B61BEF0D-F0BB-DE4B-95CE-6DB70DBA9567}" type="datetimeFigureOut">
               <a:rPr lang="en-US" dirty="0"/>
               <a:pPr/>
-              <a:t>4/30/2018</a:t>
+              <a:t>5/11/2018</a:t>
             </a:fld>
             <a:endParaRPr lang="en-US" dirty="0"/>
           </a:p>
@@ -4476,7 +4477,7 @@
             <a:fld id="{B61BEF0D-F0BB-DE4B-95CE-6DB70DBA9567}" type="datetimeFigureOut">
               <a:rPr lang="en-US" dirty="0"/>
               <a:pPr/>
-              <a:t>4/30/2018</a:t>
+              <a:t>5/11/2018</a:t>
             </a:fld>
             <a:endParaRPr lang="en-US" dirty="0"/>
           </a:p>
@@ -4758,7 +4759,7 @@
             <a:fld id="{B61BEF0D-F0BB-DE4B-95CE-6DB70DBA9567}" type="datetimeFigureOut">
               <a:rPr lang="en-US" dirty="0"/>
               <a:pPr/>
-              <a:t>4/30/2018</a:t>
+              <a:t>5/11/2018</a:t>
             </a:fld>
             <a:endParaRPr lang="en-US" dirty="0"/>
           </a:p>
@@ -5079,7 +5080,7 @@
             <a:fld id="{B61BEF0D-F0BB-DE4B-95CE-6DB70DBA9567}" type="datetimeFigureOut">
               <a:rPr lang="en-US" dirty="0"/>
               <a:pPr/>
-              <a:t>4/30/2018</a:t>
+              <a:t>5/11/2018</a:t>
             </a:fld>
             <a:endParaRPr lang="en-US" dirty="0"/>
           </a:p>
@@ -5290,7 +5291,7 @@
             <a:fld id="{B61BEF0D-F0BB-DE4B-95CE-6DB70DBA9567}" type="datetimeFigureOut">
               <a:rPr lang="en-US" dirty="0"/>
               <a:pPr/>
-              <a:t>4/30/2018</a:t>
+              <a:t>5/11/2018</a:t>
             </a:fld>
             <a:endParaRPr lang="en-US" dirty="0"/>
           </a:p>
@@ -6074,8 +6075,8 @@
           </a:p>
         </p:txBody>
       </p:sp>
-      <mc:AlternateContent xmlns:mc="http://schemas.openxmlformats.org/markup-compatibility/2006">
-        <mc:Choice xmlns:a14="http://schemas.microsoft.com/office/drawing/2010/main" Requires="a14">
+      <mc:AlternateContent xmlns:mc="http://schemas.openxmlformats.org/markup-compatibility/2006" xmlns:a14="http://schemas.microsoft.com/office/drawing/2010/main">
+        <mc:Choice Requires="a14">
           <p:sp>
             <p:nvSpPr>
               <p:cNvPr id="3" name="Content Placeholder 2">
@@ -6159,7 +6160,9 @@
                 <a14:m>
                   <m:oMath xmlns:m="http://schemas.openxmlformats.org/officeDocument/2006/math">
                     <m:r>
-                      <a:rPr lang="en-US" sz="2800" i="1"/>
+                      <a:rPr lang="en-US" sz="2800" i="1">
+                        <a:latin typeface="Cambria Math" panose="02040503050406030204" pitchFamily="18" charset="0"/>
+                      </a:rPr>
                       <m:t>°</m:t>
                     </m:r>
                   </m:oMath>
@@ -6178,7 +6181,7 @@
             </p:txBody>
           </p:sp>
         </mc:Choice>
-        <mc:Fallback>
+        <mc:Fallback xmlns="">
           <p:sp>
             <p:nvSpPr>
               <p:cNvPr id="3" name="Content Placeholder 2">
@@ -7049,6 +7052,128 @@
 </file>
 
 <file path=ppt/slides/slide15.xml><?xml version="1.0" encoding="utf-8"?>
+<p:sld xmlns:a="http://schemas.openxmlformats.org/drawingml/2006/main" xmlns:r="http://schemas.openxmlformats.org/officeDocument/2006/relationships" xmlns:p="http://schemas.openxmlformats.org/presentationml/2006/main">
+  <p:cSld>
+    <p:spTree>
+      <p:nvGrpSpPr>
+        <p:cNvPr id="1" name=""/>
+        <p:cNvGrpSpPr/>
+        <p:nvPr/>
+      </p:nvGrpSpPr>
+      <p:grpSpPr>
+        <a:xfrm>
+          <a:off x="0" y="0"/>
+          <a:ext cx="0" cy="0"/>
+          <a:chOff x="0" y="0"/>
+          <a:chExt cx="0" cy="0"/>
+        </a:xfrm>
+      </p:grpSpPr>
+      <p:sp>
+        <p:nvSpPr>
+          <p:cNvPr id="2" name="Title 1">
+            <a:extLst>
+              <a:ext uri="{FF2B5EF4-FFF2-40B4-BE49-F238E27FC236}">
+                <a16:creationId xmlns:a16="http://schemas.microsoft.com/office/drawing/2014/main" id="{BDAC53BE-2491-43F4-9D2F-E1A24BC4BDD4}"/>
+              </a:ext>
+            </a:extLst>
+          </p:cNvPr>
+          <p:cNvSpPr>
+            <a:spLocks noGrp="1"/>
+          </p:cNvSpPr>
+          <p:nvPr>
+            <p:ph type="title"/>
+          </p:nvPr>
+        </p:nvSpPr>
+        <p:spPr/>
+        <p:txBody>
+          <a:bodyPr/>
+          <a:lstStyle/>
+          <a:p>
+            <a:r>
+              <a:rPr lang="en-US" dirty="0"/>
+              <a:t>Optimization</a:t>
+            </a:r>
+          </a:p>
+        </p:txBody>
+      </p:sp>
+      <p:sp>
+        <p:nvSpPr>
+          <p:cNvPr id="3" name="Content Placeholder 2">
+            <a:extLst>
+              <a:ext uri="{FF2B5EF4-FFF2-40B4-BE49-F238E27FC236}">
+                <a16:creationId xmlns:a16="http://schemas.microsoft.com/office/drawing/2014/main" id="{1AAFE501-D212-416C-AEBD-FB115692A2B0}"/>
+              </a:ext>
+            </a:extLst>
+          </p:cNvPr>
+          <p:cNvSpPr>
+            <a:spLocks noGrp="1"/>
+          </p:cNvSpPr>
+          <p:nvPr>
+            <p:ph idx="1"/>
+          </p:nvPr>
+        </p:nvSpPr>
+        <p:spPr/>
+        <p:txBody>
+          <a:bodyPr>
+            <a:normAutofit/>
+          </a:bodyPr>
+          <a:lstStyle/>
+          <a:p>
+            <a:r>
+              <a:rPr lang="en-US" sz="2800" dirty="0"/>
+              <a:t>Split the data</a:t>
+            </a:r>
+          </a:p>
+          <a:p>
+            <a:pPr lvl="1"/>
+            <a:r>
+              <a:rPr lang="en-US" sz="2600" dirty="0"/>
+              <a:t>75% training</a:t>
+            </a:r>
+          </a:p>
+          <a:p>
+            <a:pPr lvl="2"/>
+            <a:r>
+              <a:rPr lang="en-US" sz="2400" dirty="0"/>
+              <a:t>Fit the classifier</a:t>
+            </a:r>
+          </a:p>
+          <a:p>
+            <a:pPr lvl="1"/>
+            <a:r>
+              <a:rPr lang="en-US" sz="2600" dirty="0"/>
+              <a:t>25% testing</a:t>
+            </a:r>
+          </a:p>
+          <a:p>
+            <a:pPr lvl="2"/>
+            <a:r>
+              <a:rPr lang="en-US" sz="2400" dirty="0"/>
+              <a:t>Get predictions</a:t>
+            </a:r>
+          </a:p>
+          <a:p>
+            <a:r>
+              <a:rPr lang="en-US" sz="2800" dirty="0"/>
+              <a:t>Compare</a:t>
+            </a:r>
+          </a:p>
+        </p:txBody>
+      </p:sp>
+    </p:spTree>
+    <p:extLst>
+      <p:ext uri="{BB962C8B-B14F-4D97-AF65-F5344CB8AC3E}">
+        <p14:creationId xmlns:p14="http://schemas.microsoft.com/office/powerpoint/2010/main" val="1409234782"/>
+      </p:ext>
+    </p:extLst>
+  </p:cSld>
+  <p:clrMapOvr>
+    <a:masterClrMapping/>
+  </p:clrMapOvr>
+</p:sld>
+</file>
+
+<file path=ppt/slides/slide16.xml><?xml version="1.0" encoding="utf-8"?>
 <p:sld xmlns:a="http://schemas.openxmlformats.org/drawingml/2006/main" xmlns:r="http://schemas.openxmlformats.org/officeDocument/2006/relationships" xmlns:p="http://schemas.openxmlformats.org/presentationml/2006/main">
   <p:cSld>
     <p:spTree>
@@ -10505,7 +10630,7 @@
           <a:graphicData uri="http://schemas.openxmlformats.org/presentationml/2006/ole">
             <mc:AlternateContent xmlns:mc="http://schemas.openxmlformats.org/markup-compatibility/2006">
               <mc:Choice xmlns:v="urn:schemas-microsoft-com:vml" Requires="v">
-                <p:oleObj spid="_x0000_s3105" name="Equation" r:id="rId3" imgW="114120" imgH="177480" progId="Equation.DSMT4">
+                <p:oleObj spid="_x0000_s3113" name="Equation" r:id="rId3" imgW="114120" imgH="177480" progId="Equation.DSMT4">
                   <p:embed/>
                 </p:oleObj>
               </mc:Choice>
@@ -10568,7 +10693,7 @@
           <a:graphicData uri="http://schemas.openxmlformats.org/presentationml/2006/ole">
             <mc:AlternateContent xmlns:mc="http://schemas.openxmlformats.org/markup-compatibility/2006">
               <mc:Choice xmlns:v="urn:schemas-microsoft-com:vml" Requires="v">
-                <p:oleObj spid="_x0000_s3106" name="Equation" r:id="rId5" imgW="914400" imgH="198720" progId="Equation.DSMT4">
+                <p:oleObj spid="_x0000_s3114" name="Equation" r:id="rId5" imgW="914400" imgH="198720" progId="Equation.DSMT4">
                   <p:embed/>
                 </p:oleObj>
               </mc:Choice>
@@ -10697,7 +10822,7 @@
           <a:graphicData uri="http://schemas.openxmlformats.org/presentationml/2006/ole">
             <mc:AlternateContent xmlns:mc="http://schemas.openxmlformats.org/markup-compatibility/2006">
               <mc:Choice xmlns:v="urn:schemas-microsoft-com:vml" Requires="v">
-                <p:oleObj spid="_x0000_s2088" name="Equation" r:id="rId3" imgW="2603160" imgH="1422360" progId="Equation.DSMT4">
+                <p:oleObj spid="_x0000_s2096" name="Equation" r:id="rId3" imgW="2603160" imgH="1422360" progId="Equation.DSMT4">
                   <p:embed/>
                 </p:oleObj>
               </mc:Choice>
@@ -10766,7 +10891,7 @@
           <a:graphicData uri="http://schemas.openxmlformats.org/presentationml/2006/ole">
             <mc:AlternateContent xmlns:mc="http://schemas.openxmlformats.org/markup-compatibility/2006">
               <mc:Choice xmlns:v="urn:schemas-microsoft-com:vml" Requires="v">
-                <p:oleObj spid="_x0000_s2089" name="Equation" r:id="rId5" imgW="457200" imgH="914400" progId="Equation.DSMT4">
+                <p:oleObj spid="_x0000_s2097" name="Equation" r:id="rId5" imgW="457200" imgH="914400" progId="Equation.DSMT4">
                   <p:embed/>
                 </p:oleObj>
               </mc:Choice>

</xml_diff>